<commit_message>
Tuesday week 2 slides updated
</commit_message>
<xml_diff>
--- a/slides/Minimal Pair Therapy.pptx
+++ b/slides/Minimal Pair Therapy.pptx
@@ -328,7 +328,7 @@
             <a:fld id="{5586B75A-687E-405C-8A0B-8D00578BA2C3}" type="datetimeFigureOut">
               <a:rPr lang="en-US" dirty="0"/>
               <a:pPr/>
-              <a:t>1/10/22</a:t>
+              <a:t>4/3/22</a:t>
             </a:fld>
             <a:endParaRPr lang="en-US" dirty="0"/>
           </a:p>
@@ -517,7 +517,7 @@
           <a:p>
             <a:fld id="{5F4E5243-F52A-4D37-9694-EB26C6C31910}" type="datetimeFigureOut">
               <a:rPr lang="en-US" dirty="0"/>
-              <a:t>1/10/22</a:t>
+              <a:t>4/3/22</a:t>
             </a:fld>
             <a:endParaRPr lang="en-US" dirty="0"/>
           </a:p>
@@ -695,7 +695,7 @@
           <a:p>
             <a:fld id="{3A77B6E1-634A-48DC-9E8B-D894023267EF}" type="datetimeFigureOut">
               <a:rPr lang="en-US" dirty="0"/>
-              <a:t>1/10/22</a:t>
+              <a:t>4/3/22</a:t>
             </a:fld>
             <a:endParaRPr lang="en-US" dirty="0"/>
           </a:p>
@@ -863,7 +863,7 @@
           <a:p>
             <a:fld id="{7B2D3E9E-A95C-48F2-B4BF-A71542E0BE9A}" type="datetimeFigureOut">
               <a:rPr lang="en-US" dirty="0"/>
-              <a:t>1/10/22</a:t>
+              <a:t>4/3/22</a:t>
             </a:fld>
             <a:endParaRPr lang="en-US" dirty="0"/>
           </a:p>
@@ -1119,7 +1119,7 @@
             <a:fld id="{5586B75A-687E-405C-8A0B-8D00578BA2C3}" type="datetimeFigureOut">
               <a:rPr lang="en-US" dirty="0"/>
               <a:pPr/>
-              <a:t>1/10/22</a:t>
+              <a:t>4/3/22</a:t>
             </a:fld>
             <a:endParaRPr lang="en-US" dirty="0"/>
           </a:p>
@@ -1405,7 +1405,7 @@
           <a:p>
             <a:fld id="{F12952B5-7A2F-4CC8-B7CE-9234E21C2837}" type="datetimeFigureOut">
               <a:rPr lang="en-US" dirty="0"/>
-              <a:t>1/10/22</a:t>
+              <a:t>4/3/22</a:t>
             </a:fld>
             <a:endParaRPr lang="en-US" dirty="0"/>
           </a:p>
@@ -1840,7 +1840,7 @@
           <a:p>
             <a:fld id="{CE1DA07A-9201-4B4B-BAF2-015AFA30F520}" type="datetimeFigureOut">
               <a:rPr lang="en-US" dirty="0"/>
-              <a:t>1/10/22</a:t>
+              <a:t>4/3/22</a:t>
             </a:fld>
             <a:endParaRPr lang="en-US" dirty="0"/>
           </a:p>
@@ -1957,7 +1957,7 @@
           <a:p>
             <a:fld id="{73D7E00A-486F-4252-8B1D-E32645521F49}" type="datetimeFigureOut">
               <a:rPr lang="en-US" dirty="0"/>
-              <a:t>1/10/22</a:t>
+              <a:t>4/3/22</a:t>
             </a:fld>
             <a:endParaRPr lang="en-US" dirty="0"/>
           </a:p>
@@ -2052,7 +2052,7 @@
           <a:p>
             <a:fld id="{8DDF5F92-E675-4B36-9A60-69A962A68675}" type="datetimeFigureOut">
               <a:rPr lang="en-US" dirty="0"/>
-              <a:t>1/10/22</a:t>
+              <a:t>4/3/22</a:t>
             </a:fld>
             <a:endParaRPr lang="en-US" dirty="0"/>
           </a:p>
@@ -2406,7 +2406,7 @@
           <a:p>
             <a:fld id="{AF6E2C9B-5FA2-460D-9BE7-B0812FC2A6FF}" type="datetimeFigureOut">
               <a:rPr lang="en-US" dirty="0"/>
-              <a:t>1/10/22</a:t>
+              <a:t>4/3/22</a:t>
             </a:fld>
             <a:endParaRPr lang="en-US" dirty="0"/>
           </a:p>
@@ -2719,7 +2719,7 @@
             <a:fld id="{5586B75A-687E-405C-8A0B-8D00578BA2C3}" type="datetimeFigureOut">
               <a:rPr lang="en-US" dirty="0"/>
               <a:pPr/>
-              <a:t>1/10/22</a:t>
+              <a:t>4/3/22</a:t>
             </a:fld>
             <a:endParaRPr lang="en-US" dirty="0"/>
           </a:p>
@@ -2952,7 +2952,7 @@
             <a:fld id="{5586B75A-687E-405C-8A0B-8D00578BA2C3}" type="datetimeFigureOut">
               <a:rPr lang="en-US" dirty="0"/>
               <a:pPr/>
-              <a:t>1/10/22</a:t>
+              <a:t>4/3/22</a:t>
             </a:fld>
             <a:endParaRPr lang="en-US" dirty="0"/>
           </a:p>
@@ -3392,36 +3392,6 @@
       </p:grpSpPr>
       <p:pic>
         <p:nvPicPr>
-          <p:cNvPr id="6" name="Picture 6" descr="A picture containing doll, toy, clipart&#10;&#10;Description automatically generated">
-            <a:extLst>
-              <a:ext uri="{FF2B5EF4-FFF2-40B4-BE49-F238E27FC236}">
-                <a16:creationId xmlns:a16="http://schemas.microsoft.com/office/drawing/2014/main" id="{DE81D696-1393-4ED8-BBA3-ED644DC7FA32}"/>
-              </a:ext>
-            </a:extLst>
-          </p:cNvPr>
-          <p:cNvPicPr>
-            <a:picLocks noChangeAspect="1"/>
-          </p:cNvPicPr>
-          <p:nvPr/>
-        </p:nvPicPr>
-        <p:blipFill>
-          <a:blip r:embed="rId2"/>
-          <a:stretch>
-            <a:fillRect/>
-          </a:stretch>
-        </p:blipFill>
-        <p:spPr>
-          <a:xfrm>
-            <a:off x="10725331" y="5020664"/>
-            <a:ext cx="1466850" cy="1704975"/>
-          </a:xfrm>
-          <a:prstGeom prst="rect">
-            <a:avLst/>
-          </a:prstGeom>
-        </p:spPr>
-      </p:pic>
-      <p:pic>
-        <p:nvPicPr>
           <p:cNvPr id="4" name="Picture 4" descr="A picture containing text&#10;&#10;Description automatically generated">
             <a:extLst>
               <a:ext uri="{FF2B5EF4-FFF2-40B4-BE49-F238E27FC236}">
@@ -3435,7 +3405,7 @@
           <p:nvPr/>
         </p:nvPicPr>
         <p:blipFill>
-          <a:blip r:embed="rId3"/>
+          <a:blip r:embed="rId2"/>
           <a:stretch>
             <a:fillRect/>
           </a:stretch>
@@ -3470,7 +3440,7 @@
           <p:nvPr/>
         </p:nvPicPr>
         <p:blipFill>
-          <a:blip r:embed="rId4"/>
+          <a:blip r:embed="rId3"/>
           <a:stretch>
             <a:fillRect/>
           </a:stretch>
@@ -3488,156 +3458,6 @@
               <a:schemeClr val="tx1"/>
             </a:solidFill>
           </a:ln>
-        </p:spPr>
-      </p:pic>
-      <p:pic>
-        <p:nvPicPr>
-          <p:cNvPr id="7" name="Picture 6" descr="A picture containing doll, toy, clipart&#10;&#10;Description automatically generated">
-            <a:extLst>
-              <a:ext uri="{FF2B5EF4-FFF2-40B4-BE49-F238E27FC236}">
-                <a16:creationId xmlns:a16="http://schemas.microsoft.com/office/drawing/2014/main" id="{0F7108A5-8B6A-4DD3-82B6-4579F73C413A}"/>
-              </a:ext>
-            </a:extLst>
-          </p:cNvPr>
-          <p:cNvPicPr>
-            <a:picLocks noChangeAspect="1"/>
-          </p:cNvPicPr>
-          <p:nvPr/>
-        </p:nvPicPr>
-        <p:blipFill>
-          <a:blip r:embed="rId2"/>
-          <a:stretch>
-            <a:fillRect/>
-          </a:stretch>
-        </p:blipFill>
-        <p:spPr>
-          <a:xfrm>
-            <a:off x="10653443" y="5020663"/>
-            <a:ext cx="1466850" cy="1704975"/>
-          </a:xfrm>
-          <a:prstGeom prst="rect">
-            <a:avLst/>
-          </a:prstGeom>
-        </p:spPr>
-      </p:pic>
-      <p:pic>
-        <p:nvPicPr>
-          <p:cNvPr id="8" name="Picture 6" descr="A picture containing doll, toy, clipart&#10;&#10;Description automatically generated">
-            <a:extLst>
-              <a:ext uri="{FF2B5EF4-FFF2-40B4-BE49-F238E27FC236}">
-                <a16:creationId xmlns:a16="http://schemas.microsoft.com/office/drawing/2014/main" id="{63CB5D0B-96C6-46A7-B0D7-549B9C5C438B}"/>
-              </a:ext>
-            </a:extLst>
-          </p:cNvPr>
-          <p:cNvPicPr>
-            <a:picLocks noChangeAspect="1"/>
-          </p:cNvPicPr>
-          <p:nvPr/>
-        </p:nvPicPr>
-        <p:blipFill>
-          <a:blip r:embed="rId2"/>
-          <a:stretch>
-            <a:fillRect/>
-          </a:stretch>
-        </p:blipFill>
-        <p:spPr>
-          <a:xfrm>
-            <a:off x="10653443" y="5020663"/>
-            <a:ext cx="1466850" cy="1704975"/>
-          </a:xfrm>
-          <a:prstGeom prst="rect">
-            <a:avLst/>
-          </a:prstGeom>
-        </p:spPr>
-      </p:pic>
-      <p:pic>
-        <p:nvPicPr>
-          <p:cNvPr id="9" name="Picture 6" descr="A picture containing doll, toy, clipart&#10;&#10;Description automatically generated">
-            <a:extLst>
-              <a:ext uri="{FF2B5EF4-FFF2-40B4-BE49-F238E27FC236}">
-                <a16:creationId xmlns:a16="http://schemas.microsoft.com/office/drawing/2014/main" id="{C8F94E03-F968-43DB-9E29-F9392F3ED080}"/>
-              </a:ext>
-            </a:extLst>
-          </p:cNvPr>
-          <p:cNvPicPr>
-            <a:picLocks noChangeAspect="1"/>
-          </p:cNvPicPr>
-          <p:nvPr/>
-        </p:nvPicPr>
-        <p:blipFill>
-          <a:blip r:embed="rId2"/>
-          <a:stretch>
-            <a:fillRect/>
-          </a:stretch>
-        </p:blipFill>
-        <p:spPr>
-          <a:xfrm>
-            <a:off x="10653443" y="4948776"/>
-            <a:ext cx="1466850" cy="1704975"/>
-          </a:xfrm>
-          <a:prstGeom prst="rect">
-            <a:avLst/>
-          </a:prstGeom>
-        </p:spPr>
-      </p:pic>
-      <p:pic>
-        <p:nvPicPr>
-          <p:cNvPr id="10" name="Picture 6" descr="A picture containing doll, toy, clipart&#10;&#10;Description automatically generated">
-            <a:extLst>
-              <a:ext uri="{FF2B5EF4-FFF2-40B4-BE49-F238E27FC236}">
-                <a16:creationId xmlns:a16="http://schemas.microsoft.com/office/drawing/2014/main" id="{66D6D32B-13C6-45CB-AEF2-BF563FFF7DBA}"/>
-              </a:ext>
-            </a:extLst>
-          </p:cNvPr>
-          <p:cNvPicPr>
-            <a:picLocks noChangeAspect="1"/>
-          </p:cNvPicPr>
-          <p:nvPr/>
-        </p:nvPicPr>
-        <p:blipFill>
-          <a:blip r:embed="rId2"/>
-          <a:stretch>
-            <a:fillRect/>
-          </a:stretch>
-        </p:blipFill>
-        <p:spPr>
-          <a:xfrm>
-            <a:off x="10653443" y="5020664"/>
-            <a:ext cx="1466850" cy="1704975"/>
-          </a:xfrm>
-          <a:prstGeom prst="rect">
-            <a:avLst/>
-          </a:prstGeom>
-        </p:spPr>
-      </p:pic>
-      <p:pic>
-        <p:nvPicPr>
-          <p:cNvPr id="11" name="Picture 6" descr="A picture containing doll, toy, clipart&#10;&#10;Description automatically generated">
-            <a:extLst>
-              <a:ext uri="{FF2B5EF4-FFF2-40B4-BE49-F238E27FC236}">
-                <a16:creationId xmlns:a16="http://schemas.microsoft.com/office/drawing/2014/main" id="{D842FD6D-524E-4A05-B317-E6799570E87C}"/>
-              </a:ext>
-            </a:extLst>
-          </p:cNvPr>
-          <p:cNvPicPr>
-            <a:picLocks noChangeAspect="1"/>
-          </p:cNvPicPr>
-          <p:nvPr/>
-        </p:nvPicPr>
-        <p:blipFill>
-          <a:blip r:embed="rId2"/>
-          <a:stretch>
-            <a:fillRect/>
-          </a:stretch>
-        </p:blipFill>
-        <p:spPr>
-          <a:xfrm>
-            <a:off x="10567178" y="5020663"/>
-            <a:ext cx="1466850" cy="1704975"/>
-          </a:xfrm>
-          <a:prstGeom prst="rect">
-            <a:avLst/>
-          </a:prstGeom>
         </p:spPr>
       </p:pic>
     </p:spTree>
@@ -4172,156 +3992,6 @@
       </p:grpSpPr>
       <p:pic>
         <p:nvPicPr>
-          <p:cNvPr id="13" name="Picture 12" descr="A picture containing doll, toy, clipart&#10;&#10;Description automatically generated">
-            <a:extLst>
-              <a:ext uri="{FF2B5EF4-FFF2-40B4-BE49-F238E27FC236}">
-                <a16:creationId xmlns:a16="http://schemas.microsoft.com/office/drawing/2014/main" id="{6E172255-BFF1-4D74-A57C-95E0B1FCEC3D}"/>
-              </a:ext>
-            </a:extLst>
-          </p:cNvPr>
-          <p:cNvPicPr>
-            <a:picLocks noChangeAspect="1"/>
-          </p:cNvPicPr>
-          <p:nvPr/>
-        </p:nvPicPr>
-        <p:blipFill>
-          <a:blip r:embed="rId2"/>
-          <a:stretch>
-            <a:fillRect/>
-          </a:stretch>
-        </p:blipFill>
-        <p:spPr>
-          <a:xfrm>
-            <a:off x="10619386" y="4881741"/>
-            <a:ext cx="1304925" cy="1724025"/>
-          </a:xfrm>
-          <a:prstGeom prst="rect">
-            <a:avLst/>
-          </a:prstGeom>
-        </p:spPr>
-      </p:pic>
-      <p:pic>
-        <p:nvPicPr>
-          <p:cNvPr id="14" name="Picture 12" descr="A picture containing doll, toy, clipart&#10;&#10;Description automatically generated">
-            <a:extLst>
-              <a:ext uri="{FF2B5EF4-FFF2-40B4-BE49-F238E27FC236}">
-                <a16:creationId xmlns:a16="http://schemas.microsoft.com/office/drawing/2014/main" id="{7653E8D5-2AED-4890-A687-D9868110726D}"/>
-              </a:ext>
-            </a:extLst>
-          </p:cNvPr>
-          <p:cNvPicPr>
-            <a:picLocks noChangeAspect="1"/>
-          </p:cNvPicPr>
-          <p:nvPr/>
-        </p:nvPicPr>
-        <p:blipFill>
-          <a:blip r:embed="rId2"/>
-          <a:stretch>
-            <a:fillRect/>
-          </a:stretch>
-        </p:blipFill>
-        <p:spPr>
-          <a:xfrm>
-            <a:off x="10619387" y="4939251"/>
-            <a:ext cx="1304925" cy="1724025"/>
-          </a:xfrm>
-          <a:prstGeom prst="rect">
-            <a:avLst/>
-          </a:prstGeom>
-        </p:spPr>
-      </p:pic>
-      <p:pic>
-        <p:nvPicPr>
-          <p:cNvPr id="15" name="Picture 12" descr="A picture containing doll, toy, clipart&#10;&#10;Description automatically generated">
-            <a:extLst>
-              <a:ext uri="{FF2B5EF4-FFF2-40B4-BE49-F238E27FC236}">
-                <a16:creationId xmlns:a16="http://schemas.microsoft.com/office/drawing/2014/main" id="{4D0C7407-6948-46B0-879C-D4933179ABC3}"/>
-              </a:ext>
-            </a:extLst>
-          </p:cNvPr>
-          <p:cNvPicPr>
-            <a:picLocks noChangeAspect="1"/>
-          </p:cNvPicPr>
-          <p:nvPr/>
-        </p:nvPicPr>
-        <p:blipFill>
-          <a:blip r:embed="rId2"/>
-          <a:stretch>
-            <a:fillRect/>
-          </a:stretch>
-        </p:blipFill>
-        <p:spPr>
-          <a:xfrm>
-            <a:off x="10619386" y="4881741"/>
-            <a:ext cx="1304925" cy="1724025"/>
-          </a:xfrm>
-          <a:prstGeom prst="rect">
-            <a:avLst/>
-          </a:prstGeom>
-        </p:spPr>
-      </p:pic>
-      <p:pic>
-        <p:nvPicPr>
-          <p:cNvPr id="16" name="Picture 12" descr="A picture containing doll, toy, clipart&#10;&#10;Description automatically generated">
-            <a:extLst>
-              <a:ext uri="{FF2B5EF4-FFF2-40B4-BE49-F238E27FC236}">
-                <a16:creationId xmlns:a16="http://schemas.microsoft.com/office/drawing/2014/main" id="{68A56DD2-CEEE-4407-B2DB-C3FA0D904D59}"/>
-              </a:ext>
-            </a:extLst>
-          </p:cNvPr>
-          <p:cNvPicPr>
-            <a:picLocks noChangeAspect="1"/>
-          </p:cNvPicPr>
-          <p:nvPr/>
-        </p:nvPicPr>
-        <p:blipFill>
-          <a:blip r:embed="rId2"/>
-          <a:stretch>
-            <a:fillRect/>
-          </a:stretch>
-        </p:blipFill>
-        <p:spPr>
-          <a:xfrm>
-            <a:off x="10619387" y="4939251"/>
-            <a:ext cx="1304925" cy="1724025"/>
-          </a:xfrm>
-          <a:prstGeom prst="rect">
-            <a:avLst/>
-          </a:prstGeom>
-        </p:spPr>
-      </p:pic>
-      <p:pic>
-        <p:nvPicPr>
-          <p:cNvPr id="17" name="Picture 12" descr="A picture containing doll, toy, clipart&#10;&#10;Description automatically generated">
-            <a:extLst>
-              <a:ext uri="{FF2B5EF4-FFF2-40B4-BE49-F238E27FC236}">
-                <a16:creationId xmlns:a16="http://schemas.microsoft.com/office/drawing/2014/main" id="{07A92C4C-14C7-4D8D-9679-72EFB7549A8B}"/>
-              </a:ext>
-            </a:extLst>
-          </p:cNvPr>
-          <p:cNvPicPr>
-            <a:picLocks noChangeAspect="1"/>
-          </p:cNvPicPr>
-          <p:nvPr/>
-        </p:nvPicPr>
-        <p:blipFill>
-          <a:blip r:embed="rId2"/>
-          <a:stretch>
-            <a:fillRect/>
-          </a:stretch>
-        </p:blipFill>
-        <p:spPr>
-          <a:xfrm>
-            <a:off x="10619386" y="4939250"/>
-            <a:ext cx="1304925" cy="1724025"/>
-          </a:xfrm>
-          <a:prstGeom prst="rect">
-            <a:avLst/>
-          </a:prstGeom>
-        </p:spPr>
-      </p:pic>
-      <p:pic>
-        <p:nvPicPr>
           <p:cNvPr id="2" name="Picture 2" descr="A picture containing text, clipart, vector graphics&#10;&#10;Description automatically generated">
             <a:extLst>
               <a:ext uri="{FF2B5EF4-FFF2-40B4-BE49-F238E27FC236}">
@@ -4335,7 +4005,7 @@
           <p:nvPr/>
         </p:nvPicPr>
         <p:blipFill>
-          <a:blip r:embed="rId3"/>
+          <a:blip r:embed="rId2"/>
           <a:stretch>
             <a:fillRect/>
           </a:stretch>
@@ -4370,7 +4040,7 @@
           <p:nvPr/>
         </p:nvPicPr>
         <p:blipFill>
-          <a:blip r:embed="rId4"/>
+          <a:blip r:embed="rId3"/>
           <a:stretch>
             <a:fillRect/>
           </a:stretch>
@@ -4488,156 +4158,6 @@
               <a:schemeClr val="tx1"/>
             </a:solidFill>
           </a:ln>
-        </p:spPr>
-      </p:pic>
-      <p:pic>
-        <p:nvPicPr>
-          <p:cNvPr id="12" name="Picture 12">
-            <a:extLst>
-              <a:ext uri="{FF2B5EF4-FFF2-40B4-BE49-F238E27FC236}">
-                <a16:creationId xmlns:a16="http://schemas.microsoft.com/office/drawing/2014/main" id="{F1C6AD27-EB8B-4194-BA51-E753638295F6}"/>
-              </a:ext>
-            </a:extLst>
-          </p:cNvPr>
-          <p:cNvPicPr>
-            <a:picLocks noChangeAspect="1"/>
-          </p:cNvPicPr>
-          <p:nvPr/>
-        </p:nvPicPr>
-        <p:blipFill>
-          <a:blip r:embed="rId4"/>
-          <a:stretch>
-            <a:fillRect/>
-          </a:stretch>
-        </p:blipFill>
-        <p:spPr>
-          <a:xfrm>
-            <a:off x="10432841" y="4742911"/>
-            <a:ext cx="1419225" cy="1771650"/>
-          </a:xfrm>
-          <a:prstGeom prst="rect">
-            <a:avLst/>
-          </a:prstGeom>
-        </p:spPr>
-      </p:pic>
-      <p:pic>
-        <p:nvPicPr>
-          <p:cNvPr id="13" name="Picture 12">
-            <a:extLst>
-              <a:ext uri="{FF2B5EF4-FFF2-40B4-BE49-F238E27FC236}">
-                <a16:creationId xmlns:a16="http://schemas.microsoft.com/office/drawing/2014/main" id="{9C62DB12-21F2-4A70-945B-9F891EE471C5}"/>
-              </a:ext>
-            </a:extLst>
-          </p:cNvPr>
-          <p:cNvPicPr>
-            <a:picLocks noChangeAspect="1"/>
-          </p:cNvPicPr>
-          <p:nvPr/>
-        </p:nvPicPr>
-        <p:blipFill>
-          <a:blip r:embed="rId4"/>
-          <a:stretch>
-            <a:fillRect/>
-          </a:stretch>
-        </p:blipFill>
-        <p:spPr>
-          <a:xfrm>
-            <a:off x="10432840" y="4742910"/>
-            <a:ext cx="1419225" cy="1771650"/>
-          </a:xfrm>
-          <a:prstGeom prst="rect">
-            <a:avLst/>
-          </a:prstGeom>
-        </p:spPr>
-      </p:pic>
-      <p:pic>
-        <p:nvPicPr>
-          <p:cNvPr id="14" name="Picture 12">
-            <a:extLst>
-              <a:ext uri="{FF2B5EF4-FFF2-40B4-BE49-F238E27FC236}">
-                <a16:creationId xmlns:a16="http://schemas.microsoft.com/office/drawing/2014/main" id="{CE8CC7D2-D8E1-4CF3-B3F0-632F956B0A3E}"/>
-              </a:ext>
-            </a:extLst>
-          </p:cNvPr>
-          <p:cNvPicPr>
-            <a:picLocks noChangeAspect="1"/>
-          </p:cNvPicPr>
-          <p:nvPr/>
-        </p:nvPicPr>
-        <p:blipFill>
-          <a:blip r:embed="rId4"/>
-          <a:stretch>
-            <a:fillRect/>
-          </a:stretch>
-        </p:blipFill>
-        <p:spPr>
-          <a:xfrm>
-            <a:off x="10432841" y="4742911"/>
-            <a:ext cx="1419225" cy="1771650"/>
-          </a:xfrm>
-          <a:prstGeom prst="rect">
-            <a:avLst/>
-          </a:prstGeom>
-        </p:spPr>
-      </p:pic>
-      <p:pic>
-        <p:nvPicPr>
-          <p:cNvPr id="15" name="Picture 12">
-            <a:extLst>
-              <a:ext uri="{FF2B5EF4-FFF2-40B4-BE49-F238E27FC236}">
-                <a16:creationId xmlns:a16="http://schemas.microsoft.com/office/drawing/2014/main" id="{6A54AB39-06F4-4020-ABCA-E2AFB270051A}"/>
-              </a:ext>
-            </a:extLst>
-          </p:cNvPr>
-          <p:cNvPicPr>
-            <a:picLocks noChangeAspect="1"/>
-          </p:cNvPicPr>
-          <p:nvPr/>
-        </p:nvPicPr>
-        <p:blipFill>
-          <a:blip r:embed="rId4"/>
-          <a:stretch>
-            <a:fillRect/>
-          </a:stretch>
-        </p:blipFill>
-        <p:spPr>
-          <a:xfrm>
-            <a:off x="10432840" y="4742910"/>
-            <a:ext cx="1419225" cy="1771650"/>
-          </a:xfrm>
-          <a:prstGeom prst="rect">
-            <a:avLst/>
-          </a:prstGeom>
-        </p:spPr>
-      </p:pic>
-      <p:pic>
-        <p:nvPicPr>
-          <p:cNvPr id="16" name="Picture 12">
-            <a:extLst>
-              <a:ext uri="{FF2B5EF4-FFF2-40B4-BE49-F238E27FC236}">
-                <a16:creationId xmlns:a16="http://schemas.microsoft.com/office/drawing/2014/main" id="{06FB4FFA-B195-4A65-AF14-34AD99FD6F86}"/>
-              </a:ext>
-            </a:extLst>
-          </p:cNvPr>
-          <p:cNvPicPr>
-            <a:picLocks noChangeAspect="1"/>
-          </p:cNvPicPr>
-          <p:nvPr/>
-        </p:nvPicPr>
-        <p:blipFill>
-          <a:blip r:embed="rId4"/>
-          <a:stretch>
-            <a:fillRect/>
-          </a:stretch>
-        </p:blipFill>
-        <p:spPr>
-          <a:xfrm>
-            <a:off x="10432840" y="4742911"/>
-            <a:ext cx="1419225" cy="1771650"/>
-          </a:xfrm>
-          <a:prstGeom prst="rect">
-            <a:avLst/>
-          </a:prstGeom>
         </p:spPr>
       </p:pic>
     </p:spTree>

</xml_diff>